<commit_message>
Set Default month to 2014-05
</commit_message>
<xml_diff>
--- a/htdox/presentation.pptx
+++ b/htdox/presentation.pptx
@@ -15385,6 +15385,18 @@
   <p:clrMapOvr>
     <a:masterClrMapping/>
   </p:clrMapOvr>
+  <mc:AlternateContent xmlns:mc="http://schemas.openxmlformats.org/markup-compatibility/2006">
+    <mc:Choice xmlns:p14="http://schemas.microsoft.com/office/powerpoint/2010/main" Requires="p14">
+      <p:transition spd="slow" p14:dur="3900">
+        <p14:glitter pattern="hexagon"/>
+      </p:transition>
+    </mc:Choice>
+    <mc:Fallback>
+      <p:transition spd="slow">
+        <p:fade/>
+      </p:transition>
+    </mc:Fallback>
+  </mc:AlternateContent>
   <p:timing>
     <p:tnLst>
       <p:par>
@@ -23302,94 +23314,6 @@
           </a:prstGeom>
         </p:spPr>
       </p:pic>
-      <p:sp>
-        <p:nvSpPr>
-          <p:cNvPr id="16" name="Rectangle 15"/>
-          <p:cNvSpPr/>
-          <p:nvPr/>
-        </p:nvSpPr>
-        <p:spPr>
-          <a:xfrm>
-            <a:off x="1146375" y="5176485"/>
-            <a:ext cx="9952276" cy="1754326"/>
-          </a:xfrm>
-          <a:prstGeom prst="rect">
-            <a:avLst/>
-          </a:prstGeom>
-          <a:noFill/>
-        </p:spPr>
-        <p:txBody>
-          <a:bodyPr wrap="none" lIns="91440" tIns="45720" rIns="91440" bIns="45720">
-            <a:spAutoFit/>
-          </a:bodyPr>
-          <a:lstStyle/>
-          <a:p>
-            <a:pPr algn="ctr"/>
-            <a:r>
-              <a:rPr lang="en-US" sz="5400" b="1" dirty="0" smtClean="0">
-                <a:ln w="12700">
-                  <a:solidFill>
-                    <a:schemeClr val="accent3">
-                      <a:lumMod val="50000"/>
-                    </a:schemeClr>
-                  </a:solidFill>
-                  <a:prstDash val="solid"/>
-                </a:ln>
-                <a:pattFill prst="narHorz">
-                  <a:fgClr>
-                    <a:schemeClr val="accent3"/>
-                  </a:fgClr>
-                  <a:bgClr>
-                    <a:schemeClr val="accent3">
-                      <a:lumMod val="40000"/>
-                      <a:lumOff val="60000"/>
-                    </a:schemeClr>
-                  </a:bgClr>
-                </a:pattFill>
-                <a:effectLst>
-                  <a:innerShdw blurRad="177800">
-                    <a:schemeClr val="accent3">
-                      <a:lumMod val="50000"/>
-                    </a:schemeClr>
-                  </a:innerShdw>
-                </a:effectLst>
-              </a:rPr>
-              <a:t>PLEASE WAIT FOR THE LIVE DEMO</a:t>
-            </a:r>
-          </a:p>
-          <a:p>
-            <a:pPr algn="ctr"/>
-            <a:endParaRPr lang="en-US" sz="5400" b="1" cap="none" spc="0" dirty="0">
-              <a:ln w="12700">
-                <a:solidFill>
-                  <a:schemeClr val="accent3">
-                    <a:lumMod val="50000"/>
-                  </a:schemeClr>
-                </a:solidFill>
-                <a:prstDash val="solid"/>
-              </a:ln>
-              <a:pattFill prst="narHorz">
-                <a:fgClr>
-                  <a:schemeClr val="accent3"/>
-                </a:fgClr>
-                <a:bgClr>
-                  <a:schemeClr val="accent3">
-                    <a:lumMod val="40000"/>
-                    <a:lumOff val="60000"/>
-                  </a:schemeClr>
-                </a:bgClr>
-              </a:pattFill>
-              <a:effectLst>
-                <a:innerShdw blurRad="177800">
-                  <a:schemeClr val="accent3">
-                    <a:lumMod val="50000"/>
-                  </a:schemeClr>
-                </a:innerShdw>
-              </a:effectLst>
-            </a:endParaRPr>
-          </a:p>
-        </p:txBody>
-      </p:sp>
     </p:spTree>
     <p:extLst>
       <p:ext uri="{BB962C8B-B14F-4D97-AF65-F5344CB8AC3E}">
@@ -24608,128 +24532,6 @@
                       </p:childTnLst>
                     </p:cTn>
                   </p:par>
-                  <p:par>
-                    <p:cTn id="84" fill="hold">
-                      <p:stCondLst>
-                        <p:cond delay="indefinite"/>
-                      </p:stCondLst>
-                      <p:childTnLst>
-                        <p:par>
-                          <p:cTn id="85" fill="hold">
-                            <p:stCondLst>
-                              <p:cond delay="0"/>
-                            </p:stCondLst>
-                            <p:childTnLst>
-                              <p:par>
-                                <p:cTn id="86" presetID="31" presetClass="entr" presetSubtype="0" fill="hold" grpId="0" nodeType="clickEffect">
-                                  <p:stCondLst>
-                                    <p:cond delay="0"/>
-                                  </p:stCondLst>
-                                  <p:childTnLst>
-                                    <p:set>
-                                      <p:cBhvr>
-                                        <p:cTn id="87" dur="1" fill="hold">
-                                          <p:stCondLst>
-                                            <p:cond delay="0"/>
-                                          </p:stCondLst>
-                                        </p:cTn>
-                                        <p:tgtEl>
-                                          <p:spTgt spid="16"/>
-                                        </p:tgtEl>
-                                        <p:attrNameLst>
-                                          <p:attrName>style.visibility</p:attrName>
-                                        </p:attrNameLst>
-                                      </p:cBhvr>
-                                      <p:to>
-                                        <p:strVal val="visible"/>
-                                      </p:to>
-                                    </p:set>
-                                    <p:anim calcmode="lin" valueType="num">
-                                      <p:cBhvr>
-                                        <p:cTn id="88" dur="1000" fill="hold"/>
-                                        <p:tgtEl>
-                                          <p:spTgt spid="16"/>
-                                        </p:tgtEl>
-                                        <p:attrNameLst>
-                                          <p:attrName>ppt_w</p:attrName>
-                                        </p:attrNameLst>
-                                      </p:cBhvr>
-                                      <p:tavLst>
-                                        <p:tav tm="0">
-                                          <p:val>
-                                            <p:fltVal val="0"/>
-                                          </p:val>
-                                        </p:tav>
-                                        <p:tav tm="100000">
-                                          <p:val>
-                                            <p:strVal val="#ppt_w"/>
-                                          </p:val>
-                                        </p:tav>
-                                      </p:tavLst>
-                                    </p:anim>
-                                    <p:anim calcmode="lin" valueType="num">
-                                      <p:cBhvr>
-                                        <p:cTn id="89" dur="1000" fill="hold"/>
-                                        <p:tgtEl>
-                                          <p:spTgt spid="16"/>
-                                        </p:tgtEl>
-                                        <p:attrNameLst>
-                                          <p:attrName>ppt_h</p:attrName>
-                                        </p:attrNameLst>
-                                      </p:cBhvr>
-                                      <p:tavLst>
-                                        <p:tav tm="0">
-                                          <p:val>
-                                            <p:fltVal val="0"/>
-                                          </p:val>
-                                        </p:tav>
-                                        <p:tav tm="100000">
-                                          <p:val>
-                                            <p:strVal val="#ppt_h"/>
-                                          </p:val>
-                                        </p:tav>
-                                      </p:tavLst>
-                                    </p:anim>
-                                    <p:anim calcmode="lin" valueType="num">
-                                      <p:cBhvr>
-                                        <p:cTn id="90" dur="1000" fill="hold"/>
-                                        <p:tgtEl>
-                                          <p:spTgt spid="16"/>
-                                        </p:tgtEl>
-                                        <p:attrNameLst>
-                                          <p:attrName>style.rotation</p:attrName>
-                                        </p:attrNameLst>
-                                      </p:cBhvr>
-                                      <p:tavLst>
-                                        <p:tav tm="0">
-                                          <p:val>
-                                            <p:fltVal val="90"/>
-                                          </p:val>
-                                        </p:tav>
-                                        <p:tav tm="100000">
-                                          <p:val>
-                                            <p:fltVal val="0"/>
-                                          </p:val>
-                                        </p:tav>
-                                      </p:tavLst>
-                                    </p:anim>
-                                    <p:animEffect transition="in" filter="fade">
-                                      <p:cBhvr>
-                                        <p:cTn id="91" dur="1000"/>
-                                        <p:tgtEl>
-                                          <p:spTgt spid="16"/>
-                                        </p:tgtEl>
-                                      </p:cBhvr>
-                                    </p:animEffect>
-                                  </p:childTnLst>
-                                </p:cTn>
-                              </p:par>
-                            </p:childTnLst>
-                          </p:cTn>
-                        </p:par>
-                      </p:childTnLst>
-                    </p:cTn>
-                  </p:par>
                 </p:childTnLst>
               </p:cTn>
               <p:prevCondLst>
@@ -24749,7 +24551,7 @@
             </p:seq>
             <p:audio>
               <p:cMediaNode vol="80000">
-                <p:cTn id="92" fill="hold" display="0">
+                <p:cTn id="84" fill="hold" display="0">
                   <p:stCondLst>
                     <p:cond delay="indefinite"/>
                   </p:stCondLst>
@@ -24768,7 +24570,7 @@
             </p:audio>
             <p:audio>
               <p:cMediaNode vol="80000">
-                <p:cTn id="93" fill="hold" display="0">
+                <p:cTn id="85" fill="hold" display="0">
                   <p:stCondLst>
                     <p:cond delay="indefinite"/>
                   </p:stCondLst>
@@ -24787,7 +24589,7 @@
             </p:audio>
             <p:audio>
               <p:cMediaNode vol="80000">
-                <p:cTn id="94" fill="hold" display="0">
+                <p:cTn id="86" fill="hold" display="0">
                   <p:stCondLst>
                     <p:cond delay="indefinite"/>
                   </p:stCondLst>
@@ -24806,7 +24608,7 @@
             </p:audio>
             <p:audio>
               <p:cMediaNode vol="80000">
-                <p:cTn id="95" fill="hold" display="0">
+                <p:cTn id="87" fill="hold" display="0">
                   <p:stCondLst>
                     <p:cond delay="indefinite"/>
                   </p:stCondLst>
@@ -24825,7 +24627,7 @@
             </p:audio>
             <p:audio>
               <p:cMediaNode vol="80000">
-                <p:cTn id="96" fill="hold" display="0">
+                <p:cTn id="88" fill="hold" display="0">
                   <p:stCondLst>
                     <p:cond delay="indefinite"/>
                   </p:stCondLst>
@@ -24844,7 +24646,7 @@
             </p:audio>
             <p:audio>
               <p:cMediaNode vol="80000">
-                <p:cTn id="97" fill="hold" display="0">
+                <p:cTn id="89" fill="hold" display="0">
                   <p:stCondLst>
                     <p:cond delay="indefinite"/>
                   </p:stCondLst>
@@ -24863,7 +24665,7 @@
             </p:audio>
             <p:audio>
               <p:cMediaNode vol="80000">
-                <p:cTn id="98" fill="hold" display="0">
+                <p:cTn id="90" fill="hold" display="0">
                   <p:stCondLst>
                     <p:cond delay="indefinite"/>
                   </p:stCondLst>
@@ -24882,7 +24684,7 @@
             </p:audio>
             <p:audio>
               <p:cMediaNode vol="80000">
-                <p:cTn id="99" fill="hold" display="0">
+                <p:cTn id="91" fill="hold" display="0">
                   <p:stCondLst>
                     <p:cond delay="indefinite"/>
                   </p:stCondLst>
@@ -24901,7 +24703,7 @@
             </p:audio>
             <p:audio>
               <p:cMediaNode vol="80000">
-                <p:cTn id="100" fill="hold" display="0">
+                <p:cTn id="92" fill="hold" display="0">
                   <p:stCondLst>
                     <p:cond delay="indefinite"/>
                   </p:stCondLst>
@@ -24922,9 +24724,6 @@
         </p:cTn>
       </p:par>
     </p:tnLst>
-    <p:bldLst>
-      <p:bldP spid="16" grpId="0"/>
-    </p:bldLst>
   </p:timing>
 </p:sld>
 </file>

</xml_diff>